<commit_message>
Revert "Revert "Update Question1.pptx""
This reverts commit 6c9e0012d7fa6bdf7627e6f0469ffc8cc047914c.
</commit_message>
<xml_diff>
--- a/Agile/Tutorial 5/Question1.pptx
+++ b/Agile/Tutorial 5/Question1.pptx
@@ -10,8 +10,7 @@
     <p:sldId id="258" r:id="rId4"/>
     <p:sldId id="259" r:id="rId5"/>
     <p:sldId id="260" r:id="rId6"/>
-    <p:sldId id="261" r:id="rId7"/>
-    <p:sldId id="262" r:id="rId8"/>
+    <p:sldId id="262" r:id="rId7"/>
   </p:sldIdLst>
   <p:sldSz cx="12192000" cy="6858000"/>
   <p:notesSz cx="6858000" cy="9144000"/>
@@ -110,6 +109,11 @@
       </a:defRPr>
     </a:lvl9pPr>
   </p:defaultTextStyle>
+  <p:extLst>
+    <p:ext uri="{EFAFB233-063F-42B5-8137-9DF3F51BA10A}">
+      <p15:sldGuideLst xmlns:p15="http://schemas.microsoft.com/office/powerpoint/2012/main"/>
+    </p:ext>
+  </p:extLst>
 </p:presentation>
 </file>
 
@@ -262,7 +266,7 @@
           <a:p>
             <a:fld id="{79D46BF1-2515-3E4C-B391-8BE157E5D463}" type="datetimeFigureOut">
               <a:rPr lang="en-VN" smtClean="0"/>
-              <a:t>3/26/20</a:t>
+              <a:t>03/26/2020</a:t>
             </a:fld>
             <a:endParaRPr lang="en-VN"/>
           </a:p>
@@ -462,7 +466,7 @@
           <a:p>
             <a:fld id="{79D46BF1-2515-3E4C-B391-8BE157E5D463}" type="datetimeFigureOut">
               <a:rPr lang="en-VN" smtClean="0"/>
-              <a:t>3/26/20</a:t>
+              <a:t>03/26/2020</a:t>
             </a:fld>
             <a:endParaRPr lang="en-VN"/>
           </a:p>
@@ -672,7 +676,7 @@
           <a:p>
             <a:fld id="{79D46BF1-2515-3E4C-B391-8BE157E5D463}" type="datetimeFigureOut">
               <a:rPr lang="en-VN" smtClean="0"/>
-              <a:t>3/26/20</a:t>
+              <a:t>03/26/2020</a:t>
             </a:fld>
             <a:endParaRPr lang="en-VN"/>
           </a:p>
@@ -872,7 +876,7 @@
           <a:p>
             <a:fld id="{79D46BF1-2515-3E4C-B391-8BE157E5D463}" type="datetimeFigureOut">
               <a:rPr lang="en-VN" smtClean="0"/>
-              <a:t>3/26/20</a:t>
+              <a:t>03/26/2020</a:t>
             </a:fld>
             <a:endParaRPr lang="en-VN"/>
           </a:p>
@@ -1148,7 +1152,7 @@
           <a:p>
             <a:fld id="{79D46BF1-2515-3E4C-B391-8BE157E5D463}" type="datetimeFigureOut">
               <a:rPr lang="en-VN" smtClean="0"/>
-              <a:t>3/26/20</a:t>
+              <a:t>03/26/2020</a:t>
             </a:fld>
             <a:endParaRPr lang="en-VN"/>
           </a:p>
@@ -1416,7 +1420,7 @@
           <a:p>
             <a:fld id="{79D46BF1-2515-3E4C-B391-8BE157E5D463}" type="datetimeFigureOut">
               <a:rPr lang="en-VN" smtClean="0"/>
-              <a:t>3/26/20</a:t>
+              <a:t>03/26/2020</a:t>
             </a:fld>
             <a:endParaRPr lang="en-VN"/>
           </a:p>
@@ -1831,7 +1835,7 @@
           <a:p>
             <a:fld id="{79D46BF1-2515-3E4C-B391-8BE157E5D463}" type="datetimeFigureOut">
               <a:rPr lang="en-VN" smtClean="0"/>
-              <a:t>3/26/20</a:t>
+              <a:t>03/26/2020</a:t>
             </a:fld>
             <a:endParaRPr lang="en-VN"/>
           </a:p>
@@ -1973,7 +1977,7 @@
           <a:p>
             <a:fld id="{79D46BF1-2515-3E4C-B391-8BE157E5D463}" type="datetimeFigureOut">
               <a:rPr lang="en-VN" smtClean="0"/>
-              <a:t>3/26/20</a:t>
+              <a:t>03/26/2020</a:t>
             </a:fld>
             <a:endParaRPr lang="en-VN"/>
           </a:p>
@@ -2086,7 +2090,7 @@
           <a:p>
             <a:fld id="{79D46BF1-2515-3E4C-B391-8BE157E5D463}" type="datetimeFigureOut">
               <a:rPr lang="en-VN" smtClean="0"/>
-              <a:t>3/26/20</a:t>
+              <a:t>03/26/2020</a:t>
             </a:fld>
             <a:endParaRPr lang="en-VN"/>
           </a:p>
@@ -2399,7 +2403,7 @@
           <a:p>
             <a:fld id="{79D46BF1-2515-3E4C-B391-8BE157E5D463}" type="datetimeFigureOut">
               <a:rPr lang="en-VN" smtClean="0"/>
-              <a:t>3/26/20</a:t>
+              <a:t>03/26/2020</a:t>
             </a:fld>
             <a:endParaRPr lang="en-VN"/>
           </a:p>
@@ -2688,7 +2692,7 @@
           <a:p>
             <a:fld id="{79D46BF1-2515-3E4C-B391-8BE157E5D463}" type="datetimeFigureOut">
               <a:rPr lang="en-VN" smtClean="0"/>
-              <a:t>3/26/20</a:t>
+              <a:t>03/26/2020</a:t>
             </a:fld>
             <a:endParaRPr lang="en-VN"/>
           </a:p>
@@ -2931,7 +2935,7 @@
           <a:p>
             <a:fld id="{79D46BF1-2515-3E4C-B391-8BE157E5D463}" type="datetimeFigureOut">
               <a:rPr lang="en-VN" smtClean="0"/>
-              <a:t>3/26/20</a:t>
+              <a:t>03/26/2020</a:t>
             </a:fld>
             <a:endParaRPr lang="en-VN"/>
           </a:p>
@@ -3362,8 +3366,8 @@
         </p:nvSpPr>
         <p:spPr>
           <a:xfrm>
-            <a:off x="3436467" y="1997839"/>
-            <a:ext cx="5319065" cy="2862322"/>
+            <a:off x="179883" y="1997839"/>
+            <a:ext cx="11767278" cy="2862322"/>
           </a:xfrm>
           <a:prstGeom prst="rect">
             <a:avLst/>
@@ -3378,21 +3382,21 @@
             <a:pPr algn="ctr"/>
             <a:r>
               <a:rPr lang="en-US" sz="6000" dirty="0"/>
-              <a:t>Thinking ahead </a:t>
+              <a:t>Not Enough time </a:t>
             </a:r>
           </a:p>
           <a:p>
             <a:pPr algn="ctr"/>
             <a:r>
               <a:rPr lang="en-US" sz="6000" dirty="0"/>
-              <a:t>Communicating</a:t>
+              <a:t>Stakeholders did not feel engaged</a:t>
             </a:r>
           </a:p>
           <a:p>
             <a:pPr algn="ctr"/>
             <a:r>
               <a:rPr lang="en-US" sz="6000" dirty="0"/>
-              <a:t>Evaluation </a:t>
+              <a:t>Fixed budget </a:t>
             </a:r>
           </a:p>
         </p:txBody>
@@ -3449,9 +3453,10 @@
           <a:lstStyle/>
           <a:p>
             <a:r>
-              <a:rPr lang="en-VN" dirty="0"/>
-              <a:t>Thinking ahead</a:t>
-            </a:r>
+              <a:rPr lang="en-US" dirty="0"/>
+              <a:t>Not Enough time</a:t>
+            </a:r>
+            <a:endParaRPr lang="en-VN" dirty="0"/>
           </a:p>
         </p:txBody>
       </p:sp>
@@ -3471,7 +3476,12 @@
             <p:ph idx="1"/>
           </p:nvPr>
         </p:nvSpPr>
-        <p:spPr/>
+        <p:spPr>
+          <a:xfrm>
+            <a:off x="838200" y="1825625"/>
+            <a:ext cx="10515600" cy="3555844"/>
+          </a:xfrm>
+        </p:spPr>
         <p:txBody>
           <a:bodyPr/>
           <a:lstStyle/>
@@ -3483,18 +3493,7 @@
             </a:pPr>
             <a:r>
               <a:rPr lang="en-US" dirty="0"/>
-              <a:t>The value of project planning is to provide the opportunity and motivation, simply to get people to think ahead about the project that they are undertaking. </a:t>
-            </a:r>
-          </a:p>
-          <a:p>
-            <a:pPr algn="just">
-              <a:lnSpc>
-                <a:spcPct val="150000"/>
-              </a:lnSpc>
-            </a:pPr>
-            <a:r>
-              <a:rPr lang="en-US" dirty="0"/>
-              <a:t>This process tends to reveal problems, which helps to find solutions at early stages of a project. </a:t>
+              <a:t>To build confidence, and start managing the business change issues in both public and private sector stakeholders, early and incremental delivery was needed. Go live of phase 1 was set for 11th April; the project started on 16th December</a:t>
             </a:r>
           </a:p>
           <a:p>
@@ -3554,9 +3553,10 @@
           <a:lstStyle/>
           <a:p>
             <a:r>
-              <a:rPr lang="en-VN" dirty="0"/>
-              <a:t>Communicating</a:t>
-            </a:r>
+              <a:rPr lang="en-US" dirty="0"/>
+              <a:t>Stakeholders did not feel engaged</a:t>
+            </a:r>
+            <a:endParaRPr lang="en-VN" dirty="0"/>
           </a:p>
         </p:txBody>
       </p:sp>
@@ -3576,7 +3576,12 @@
             <p:ph idx="1"/>
           </p:nvPr>
         </p:nvSpPr>
-        <p:spPr/>
+        <p:spPr>
+          <a:xfrm>
+            <a:off x="838200" y="2841703"/>
+            <a:ext cx="10515600" cy="2341641"/>
+          </a:xfrm>
+        </p:spPr>
         <p:txBody>
           <a:bodyPr/>
           <a:lstStyle/>
@@ -3589,13 +3594,8 @@
             </a:pPr>
             <a:r>
               <a:rPr lang="en-US" dirty="0"/>
-              <a:t>Deals with producing, issuing and transmitting reports/documents, and with holding occasional meetings among the project participants so that the proposed timing, method and strategy are made available and understood. In essence, the collaboration of the various participants in a project is measured by how effectively the communication channels were managed. </a:t>
-            </a:r>
-          </a:p>
-          <a:p>
-            <a:pPr marL="0" indent="0">
-              <a:buNone/>
-            </a:pPr>
+              <a:t>As all stakeholders had contributed funding to the project and all could decide the success or failure of the project, they wanted to be part of developing the system</a:t>
+            </a:r>
             <a:endParaRPr lang="en-VN" dirty="0"/>
           </a:p>
         </p:txBody>
@@ -3652,9 +3652,10 @@
           <a:lstStyle/>
           <a:p>
             <a:r>
-              <a:rPr lang="en-VN" dirty="0"/>
-              <a:t>Evaluation</a:t>
-            </a:r>
+              <a:rPr lang="en-US" dirty="0"/>
+              <a:t>Fixed budget</a:t>
+            </a:r>
+            <a:endParaRPr lang="en-VN" dirty="0"/>
           </a:p>
         </p:txBody>
       </p:sp>
@@ -3674,10 +3675,15 @@
             <p:ph idx="1"/>
           </p:nvPr>
         </p:nvSpPr>
-        <p:spPr/>
+        <p:spPr>
+          <a:xfrm>
+            <a:off x="838200" y="3118033"/>
+            <a:ext cx="10515600" cy="1325563"/>
+          </a:xfrm>
+        </p:spPr>
         <p:txBody>
           <a:bodyPr>
-            <a:normAutofit lnSpcReduction="10000"/>
+            <a:normAutofit/>
           </a:bodyPr>
           <a:lstStyle/>
           <a:p>
@@ -3689,7 +3695,15 @@
             </a:pPr>
             <a:r>
               <a:rPr lang="en-US" dirty="0"/>
-              <a:t>Evaluation of the outcomes are critical to improve current practices. Communicating and feeding back information and messages to the project team is also essential to the achievement of the project goals by all the participants. Thus, the effectiveness of the project manager to communicate with, evaluate, and feedback to the rest of the project team during each stage of the life cycle determines how efficiently the project’s goals will be achieved. </a:t>
+              <a:t>There was already noticeable “scope creep” and some </a:t>
+            </a:r>
+            <a:r>
+              <a:rPr lang="en-US" dirty="0" err="1"/>
+              <a:t>prioritisation</a:t>
+            </a:r>
+            <a:r>
+              <a:rPr lang="en-US" dirty="0"/>
+              <a:t> had to be brought into the project.</a:t>
             </a:r>
           </a:p>
         </p:txBody>
@@ -3777,7 +3791,9 @@
         </p:nvSpPr>
         <p:spPr/>
         <p:txBody>
-          <a:bodyPr/>
+          <a:bodyPr>
+            <a:normAutofit fontScale="92500"/>
+          </a:bodyPr>
           <a:lstStyle/>
           <a:p>
             <a:pPr algn="just"/>
@@ -3787,7 +3803,11 @@
             </a:r>
             <a:r>
               <a:rPr lang="en-US" dirty="0"/>
-              <a:t> - DSDM allows for user testing all through the development process, thus allowing developers to get prompt feedback on the usability and suitability of the product.</a:t>
+              <a:t> - DSDM allows for user testing all through the development process, thus allowing developers to get prompt feedback on the usability and suitability of the product. </a:t>
+            </a:r>
+            <a:r>
+              <a:rPr lang="en-US" b="1" dirty="0"/>
+              <a:t>– Engaged Stakeholders -</a:t>
             </a:r>
           </a:p>
           <a:p>
@@ -3798,7 +3818,15 @@
             </a:r>
             <a:r>
               <a:rPr lang="en-US" dirty="0"/>
-              <a:t> - In DSDM, a Business Study is done at the beginning of the project, greatly decreasing the likelihood of late surprises in the financial realm.</a:t>
+              <a:t> - In DSDM, a Business Study is done at the beginning of the project, greatly decreasing the likelihood of late surprises in the financial realm. – </a:t>
+            </a:r>
+            <a:r>
+              <a:rPr lang="en-US" b="1" dirty="0"/>
+              <a:t>fixed budget</a:t>
+            </a:r>
+            <a:r>
+              <a:rPr lang="en-US" dirty="0"/>
+              <a:t> -</a:t>
             </a:r>
           </a:p>
           <a:p>
@@ -3809,8 +3837,13 @@
             </a:r>
             <a:r>
               <a:rPr lang="en-US" dirty="0"/>
-              <a:t> - DSDM stresses communication and collaboration between all interested parties - developers, users, etc.</a:t>
-            </a:r>
+              <a:t> - DSDM’s focus on collaboration, facilitation and stakeholder engagement helped ensure that everyone worked together and any issues were dealt with quickly.</a:t>
+            </a:r>
+            <a:r>
+              <a:rPr lang="en-US" b="1" dirty="0"/>
+              <a:t> – Engaged Stakeholders -</a:t>
+            </a:r>
+            <a:endParaRPr lang="en-US" dirty="0"/>
           </a:p>
           <a:p>
             <a:pPr marL="0" indent="0">
@@ -3903,140 +3936,43 @@
         </p:nvSpPr>
         <p:spPr/>
         <p:txBody>
-          <a:bodyPr/>
+          <a:bodyPr>
+            <a:normAutofit lnSpcReduction="10000"/>
+          </a:bodyPr>
           <a:lstStyle/>
           <a:p>
             <a:pPr algn="just"/>
             <a:r>
+              <a:rPr lang="en-US" dirty="0"/>
+              <a:t>DSDM’s emphasis on delivery to deadlines and </a:t>
+            </a:r>
+            <a:r>
+              <a:rPr lang="en-US" dirty="0" err="1"/>
+              <a:t>prioritisation</a:t>
+            </a:r>
+            <a:r>
+              <a:rPr lang="en-US" dirty="0"/>
+              <a:t> of requirements immediately helped the project team focus on the “must haves” for first deadline. The annual targets and quarterly reporting cycle built into the regulations provided obvious deadlines for the rest of the project and meant that the project could set everyone's resourcing expectations clearly in advance. Using DSDM’s techniques it became clear that this functionality was a ‘should have’ rather than ‘must have’ for delivery and so was re-scheduled for the following year </a:t>
+            </a:r>
+            <a:r>
               <a:rPr lang="en-US" b="1" dirty="0"/>
-              <a:t>The users finds the program either too hard to use that it does not work as expected</a:t>
-            </a:r>
+              <a:t>– not enough time –</a:t>
+            </a:r>
+          </a:p>
+          <a:p>
+            <a:pPr algn="just"/>
             <a:r>
               <a:rPr lang="en-US" dirty="0"/>
-              <a:t> - DSDM allows for user testing all through the development process, thus allowing developers to get prompt feedback on the usability and suitability of the product.</a:t>
+              <a:t>DSDM presented cultural difficulties for one of the key stakeholders, used to the traditional approach of working to a detailed upfront specification and Prince2 project bureaucracy</a:t>
+            </a:r>
+            <a:r>
+              <a:rPr lang="en-US" b="1" dirty="0"/>
+              <a:t>– not enough time –</a:t>
             </a:r>
           </a:p>
           <a:p>
             <a:pPr algn="just"/>
-            <a:r>
-              <a:rPr lang="en-US" b="1" dirty="0"/>
-              <a:t>Hidden flaws surface in the system due to poor design or implementation</a:t>
-            </a:r>
-            <a:r>
-              <a:rPr lang="en-US" dirty="0"/>
-              <a:t> - In DSDM, prototyping helps to ensure that the system is designed correctly and that everyone knows how it will work. Unit testing helps to uncover hidden bugs, and incremental development allows for user testing all through the development process.</a:t>
-            </a:r>
-            <a:endParaRPr lang="en-VN" dirty="0"/>
-          </a:p>
-        </p:txBody>
-      </p:sp>
-    </p:spTree>
-    <p:extLst>
-      <p:ext uri="{BB962C8B-B14F-4D97-AF65-F5344CB8AC3E}">
-        <p14:creationId xmlns:p14="http://schemas.microsoft.com/office/powerpoint/2010/main" val="2896051977"/>
-      </p:ext>
-    </p:extLst>
-  </p:cSld>
-  <p:clrMapOvr>
-    <a:masterClrMapping/>
-  </p:clrMapOvr>
-</p:sld>
-</file>
-
-<file path=ppt/slides/slide7.xml><?xml version="1.0" encoding="utf-8"?>
-<p:sld xmlns:a="http://schemas.openxmlformats.org/drawingml/2006/main" xmlns:r="http://schemas.openxmlformats.org/officeDocument/2006/relationships" xmlns:p="http://schemas.openxmlformats.org/presentationml/2006/main">
-  <p:cSld>
-    <p:spTree>
-      <p:nvGrpSpPr>
-        <p:cNvPr id="1" name=""/>
-        <p:cNvGrpSpPr/>
-        <p:nvPr/>
-      </p:nvGrpSpPr>
-      <p:grpSpPr>
-        <a:xfrm>
-          <a:off x="0" y="0"/>
-          <a:ext cx="0" cy="0"/>
-          <a:chOff x="0" y="0"/>
-          <a:chExt cx="0" cy="0"/>
-        </a:xfrm>
-      </p:grpSpPr>
-      <p:sp>
-        <p:nvSpPr>
-          <p:cNvPr id="2" name="Title 1">
-            <a:extLst>
-              <a:ext uri="{FF2B5EF4-FFF2-40B4-BE49-F238E27FC236}">
-                <a16:creationId xmlns:a16="http://schemas.microsoft.com/office/drawing/2014/main" id="{A8E9826B-4461-1F40-8081-91D6FA89FA79}"/>
-              </a:ext>
-            </a:extLst>
-          </p:cNvPr>
-          <p:cNvSpPr>
-            <a:spLocks noGrp="1"/>
-          </p:cNvSpPr>
-          <p:nvPr>
-            <p:ph type="title"/>
-          </p:nvPr>
-        </p:nvSpPr>
-        <p:spPr/>
-        <p:txBody>
-          <a:bodyPr/>
-          <a:lstStyle/>
-          <a:p>
-            <a:r>
-              <a:rPr lang="en-GB" dirty="0"/>
-              <a:t>How could the use of DSDM overcome these problems?</a:t>
-            </a:r>
-            <a:r>
-              <a:rPr lang="en-VN" dirty="0">
-                <a:effectLst/>
-              </a:rPr>
-              <a:t> </a:t>
-            </a:r>
-            <a:endParaRPr lang="en-VN" dirty="0"/>
-          </a:p>
-        </p:txBody>
-      </p:sp>
-      <p:sp>
-        <p:nvSpPr>
-          <p:cNvPr id="3" name="Content Placeholder 2">
-            <a:extLst>
-              <a:ext uri="{FF2B5EF4-FFF2-40B4-BE49-F238E27FC236}">
-                <a16:creationId xmlns:a16="http://schemas.microsoft.com/office/drawing/2014/main" id="{4162F549-9FDF-7D4C-A158-46445204C956}"/>
-              </a:ext>
-            </a:extLst>
-          </p:cNvPr>
-          <p:cNvSpPr>
-            <a:spLocks noGrp="1"/>
-          </p:cNvSpPr>
-          <p:nvPr>
-            <p:ph idx="1"/>
-          </p:nvPr>
-        </p:nvSpPr>
-        <p:spPr/>
-        <p:txBody>
-          <a:bodyPr/>
-          <a:lstStyle/>
-          <a:p>
-            <a:pPr algn="just"/>
-            <a:r>
-              <a:rPr lang="en-US" b="1" dirty="0"/>
-              <a:t>Users resist the instantiation of the system, either for political reasons, or a lack of commitment to it</a:t>
-            </a:r>
-            <a:r>
-              <a:rPr lang="en-US" dirty="0"/>
-              <a:t> - In DSDM, since the users are actively involved in the development of the system, they are more likely to embrace it and take it on.</a:t>
-            </a:r>
-          </a:p>
-          <a:p>
-            <a:pPr algn="just"/>
-            <a:r>
-              <a:rPr lang="en-US" b="1" dirty="0"/>
-              <a:t>The system is in-flexible and/or un-maintainable, and unable to adapt to change</a:t>
-            </a:r>
-            <a:r>
-              <a:rPr lang="en-US" dirty="0"/>
-              <a:t> - Since DSDM emphasizes flexibility in design, this is not likely to happen with DSDM.</a:t>
-            </a:r>
-            <a:endParaRPr lang="en-VN" dirty="0"/>
+            <a:endParaRPr lang="en-VN" b="1" dirty="0"/>
           </a:p>
         </p:txBody>
       </p:sp>

</xml_diff>